<commit_message>
Lectures 5, 6, 7
</commit_message>
<xml_diff>
--- a/lecs/cmsc320_f2021_lec05.pptx
+++ b/lecs/cmsc320_f2021_lec05.pptx
@@ -242,7 +242,7 @@
           <a:p>
             <a:fld id="{80BF8044-1598-EF4E-BBDA-D110E031C231}" type="datetimeFigureOut">
               <a:rPr lang="en-US" smtClean="0"/>
-              <a:t>9/7/21</a:t>
+              <a:t>9/13/21</a:t>
             </a:fld>
             <a:endParaRPr lang="en-US"/>
           </a:p>
@@ -408,7 +408,7 @@
           <a:p>
             <a:fld id="{8FEE2225-873F-6F40-BA29-3AE101B223B8}" type="datetimeFigureOut">
               <a:rPr lang="en-US" smtClean="0"/>
-              <a:t>9/7/21</a:t>
+              <a:t>9/13/21</a:t>
             </a:fld>
             <a:endParaRPr lang="en-US"/>
           </a:p>
@@ -10399,7 +10399,7 @@
         </p:nvSpPr>
         <p:spPr>
           <a:xfrm>
-            <a:off x="1755098" y="4460321"/>
+            <a:off x="1755098" y="4172935"/>
             <a:ext cx="8072203" cy="2002073"/>
           </a:xfrm>
           <a:prstGeom prst="roundRect">
@@ -10601,7 +10601,7 @@
         </p:nvSpPr>
         <p:spPr>
           <a:xfrm>
-            <a:off x="1755098" y="2831231"/>
+            <a:off x="1755098" y="2543845"/>
             <a:ext cx="8072203" cy="750169"/>
           </a:xfrm>
           <a:prstGeom prst="roundRect">
@@ -10800,7 +10800,7 @@
         </p:nvSpPr>
         <p:spPr>
           <a:xfrm>
-            <a:off x="5234951" y="6534436"/>
+            <a:off x="6656814" y="6534436"/>
             <a:ext cx="4946754" cy="338554"/>
           </a:xfrm>
           <a:prstGeom prst="rect">

</xml_diff>